<commit_message>
adding presentation stage 3
</commit_message>
<xml_diff>
--- a/Praca/Seminarium/seminarium_prez1_last.pptx
+++ b/Praca/Seminarium/seminarium_prez1_last.pptx
@@ -302,7 +302,7 @@
           <a:p>
             <a:fld id="{1AC32706-72C9-43E7-8E0A-734A3277496A}" type="datetimeFigureOut">
               <a:rPr lang="pl-PL" smtClean="0"/>
-              <a:t>2016-04-20</a:t>
+              <a:t>2016-06-06</a:t>
             </a:fld>
             <a:endParaRPr lang="pl-PL"/>
           </a:p>
@@ -472,7 +472,7 @@
           <a:p>
             <a:fld id="{1AC32706-72C9-43E7-8E0A-734A3277496A}" type="datetimeFigureOut">
               <a:rPr lang="pl-PL" smtClean="0"/>
-              <a:t>2016-04-20</a:t>
+              <a:t>2016-06-06</a:t>
             </a:fld>
             <a:endParaRPr lang="pl-PL"/>
           </a:p>
@@ -652,7 +652,7 @@
           <a:p>
             <a:fld id="{1AC32706-72C9-43E7-8E0A-734A3277496A}" type="datetimeFigureOut">
               <a:rPr lang="pl-PL" smtClean="0"/>
-              <a:t>2016-04-20</a:t>
+              <a:t>2016-06-06</a:t>
             </a:fld>
             <a:endParaRPr lang="pl-PL"/>
           </a:p>
@@ -822,7 +822,7 @@
           <a:p>
             <a:fld id="{1AC32706-72C9-43E7-8E0A-734A3277496A}" type="datetimeFigureOut">
               <a:rPr lang="pl-PL" smtClean="0"/>
-              <a:t>2016-04-20</a:t>
+              <a:t>2016-06-06</a:t>
             </a:fld>
             <a:endParaRPr lang="pl-PL"/>
           </a:p>
@@ -1068,7 +1068,7 @@
           <a:p>
             <a:fld id="{1AC32706-72C9-43E7-8E0A-734A3277496A}" type="datetimeFigureOut">
               <a:rPr lang="pl-PL" smtClean="0"/>
-              <a:t>2016-04-20</a:t>
+              <a:t>2016-06-06</a:t>
             </a:fld>
             <a:endParaRPr lang="pl-PL"/>
           </a:p>
@@ -1356,7 +1356,7 @@
           <a:p>
             <a:fld id="{1AC32706-72C9-43E7-8E0A-734A3277496A}" type="datetimeFigureOut">
               <a:rPr lang="pl-PL" smtClean="0"/>
-              <a:t>2016-04-20</a:t>
+              <a:t>2016-06-06</a:t>
             </a:fld>
             <a:endParaRPr lang="pl-PL"/>
           </a:p>
@@ -1778,7 +1778,7 @@
           <a:p>
             <a:fld id="{1AC32706-72C9-43E7-8E0A-734A3277496A}" type="datetimeFigureOut">
               <a:rPr lang="pl-PL" smtClean="0"/>
-              <a:t>2016-04-20</a:t>
+              <a:t>2016-06-06</a:t>
             </a:fld>
             <a:endParaRPr lang="pl-PL"/>
           </a:p>
@@ -1896,7 +1896,7 @@
           <a:p>
             <a:fld id="{1AC32706-72C9-43E7-8E0A-734A3277496A}" type="datetimeFigureOut">
               <a:rPr lang="pl-PL" smtClean="0"/>
-              <a:t>2016-04-20</a:t>
+              <a:t>2016-06-06</a:t>
             </a:fld>
             <a:endParaRPr lang="pl-PL"/>
           </a:p>
@@ -1991,7 +1991,7 @@
           <a:p>
             <a:fld id="{1AC32706-72C9-43E7-8E0A-734A3277496A}" type="datetimeFigureOut">
               <a:rPr lang="pl-PL" smtClean="0"/>
-              <a:t>2016-04-20</a:t>
+              <a:t>2016-06-06</a:t>
             </a:fld>
             <a:endParaRPr lang="pl-PL"/>
           </a:p>
@@ -2268,7 +2268,7 @@
           <a:p>
             <a:fld id="{1AC32706-72C9-43E7-8E0A-734A3277496A}" type="datetimeFigureOut">
               <a:rPr lang="pl-PL" smtClean="0"/>
-              <a:t>2016-04-20</a:t>
+              <a:t>2016-06-06</a:t>
             </a:fld>
             <a:endParaRPr lang="pl-PL"/>
           </a:p>
@@ -2521,7 +2521,7 @@
           <a:p>
             <a:fld id="{1AC32706-72C9-43E7-8E0A-734A3277496A}" type="datetimeFigureOut">
               <a:rPr lang="pl-PL" smtClean="0"/>
-              <a:t>2016-04-20</a:t>
+              <a:t>2016-06-06</a:t>
             </a:fld>
             <a:endParaRPr lang="pl-PL"/>
           </a:p>
@@ -2737,7 +2737,7 @@
           <a:p>
             <a:fld id="{1AC32706-72C9-43E7-8E0A-734A3277496A}" type="datetimeFigureOut">
               <a:rPr lang="pl-PL" smtClean="0"/>
-              <a:t>2016-04-20</a:t>
+              <a:t>2016-06-06</a:t>
             </a:fld>
             <a:endParaRPr lang="pl-PL"/>
           </a:p>
@@ -4787,8 +4787,13 @@
           <a:p>
             <a:r>
               <a:rPr lang="pl-PL" dirty="0"/>
-              <a:t>Wybór struktury do reprezentacja wielomianu</a:t>
-            </a:r>
+              <a:t>Wybór struktury do </a:t>
+            </a:r>
+            <a:r>
+              <a:rPr lang="pl-PL" dirty="0" smtClean="0"/>
+              <a:t>reprezentacji wielomianu</a:t>
+            </a:r>
+            <a:endParaRPr lang="pl-PL" dirty="0"/>
           </a:p>
         </p:txBody>
       </p:sp>

</xml_diff>